<commit_message>
add reference to repository in slides
</commit_message>
<xml_diff>
--- a/presentacion/presentacion.pptx
+++ b/presentacion/presentacion.pptx
@@ -124,6 +124,11 @@
       </a:defRPr>
     </a:lvl9pPr>
   </p:defaultTextStyle>
+  <p:extLst>
+    <p:ext uri="{EFAFB233-063F-42B5-8137-9DF3F51BA10A}">
+      <p15:sldGuideLst xmlns:p15="http://schemas.microsoft.com/office/powerpoint/2012/main"/>
+    </p:ext>
+  </p:extLst>
 </p:presentation>
 </file>
 
@@ -6482,7 +6487,9 @@
             </p:nvSpPr>
             <p:spPr/>
             <p:txBody>
-              <a:bodyPr/>
+              <a:bodyPr>
+                <a:normAutofit/>
+              </a:bodyPr>
               <a:lstStyle/>
               <a:p>
                 <a:pPr marL="0" indent="0">
@@ -6726,6 +6733,19 @@
                   <a:rPr lang="es-ES" dirty="0"/>
                   <a:t>Código en: </a:t>
                 </a:r>
+                <a:r>
+                  <a:rPr lang="es-ES" dirty="0">
+                    <a:hlinkClick r:id="rId2"/>
+                  </a:rPr>
+                  <a:t>github.com/</a:t>
+                </a:r>
+                <a:r>
+                  <a:rPr lang="es-ES" dirty="0" err="1">
+                    <a:hlinkClick r:id="rId2"/>
+                  </a:rPr>
+                  <a:t>BrianBohe</a:t>
+                </a:r>
+                <a:endParaRPr lang="es-ES" dirty="0"/>
               </a:p>
               <a:p>
                 <a:pPr marL="0" indent="0">
@@ -6761,7 +6781,7 @@
             </p:nvSpPr>
             <p:spPr>
               <a:blipFill>
-                <a:blip r:embed="rId2"/>
+                <a:blip r:embed="rId3"/>
                 <a:stretch>
                   <a:fillRect l="-1217" t="-2241"/>
                 </a:stretch>

</xml_diff>